<commit_message>
Moar chapter 4 progress
</commit_message>
<xml_diff>
--- a/lectures/KR-5.pptx
+++ b/lectures/KR-5.pptx
@@ -3543,43 +3543,9 @@
           <a:lstStyle/>
           <a:p>
             <a:r>
-              <a:rPr lang="en-US" dirty="0"/>
-              <a:t>Section 4.1 – Automatic variables and the stack</a:t>
-            </a:r>
-          </a:p>
-          <a:p>
-            <a:r>
-              <a:rPr lang="en-US" dirty="0"/>
-              <a:t>Section 4.2 – New and improved ‘void’ type</a:t>
-            </a:r>
-          </a:p>
-          <a:p>
-            <a:r>
-              <a:rPr lang="en-US" dirty="0"/>
-              <a:t>Section 4.3 – Why arrays pass by reference – the rest is Chapter 5</a:t>
-            </a:r>
-          </a:p>
-          <a:p>
-            <a:r>
-              <a:rPr lang="en-US" dirty="0"/>
-              <a:t>Section 4.10 – Recursion – because recursion </a:t>
-            </a:r>
-            <a:r>
-              <a:rPr lang="en-US" dirty="0">
-                <a:sym typeface="Wingdings" pitchFamily="2" charset="2"/>
-              </a:rPr>
-              <a:t></a:t>
-            </a:r>
-          </a:p>
-          <a:p>
-            <a:r>
-              <a:rPr lang="en-US" dirty="0">
-                <a:sym typeface="Wingdings" pitchFamily="2" charset="2"/>
-              </a:rPr>
-              <a:t>Section 4.11 – Pre-processor – Compiler architecture</a:t>
-            </a:r>
-          </a:p>
-          <a:p>
+              <a:rPr lang="en-US"/>
+              <a:t>Void type</a:t>
+            </a:r>
             <a:endParaRPr lang="en-US" dirty="0"/>
           </a:p>
           <a:p>

</xml_diff>